<commit_message>
16 sep 2021 selenium tesNg Concepts
</commit_message>
<xml_diff>
--- a/target/test-classes/TestNG.pptx
+++ b/target/test-classes/TestNG.pptx
@@ -270,7 +270,7 @@
           <a:p>
             <a:fld id="{474FEC44-FE25-432A-B7F6-7BDB637AC3B5}" type="datetimeFigureOut">
               <a:rPr lang="en-IN" smtClean="0"/>
-              <a:t>09-08-2021</a:t>
+              <a:t>15-09-2021</a:t>
             </a:fld>
             <a:endParaRPr lang="en-IN"/>
           </a:p>
@@ -470,7 +470,7 @@
           <a:p>
             <a:fld id="{474FEC44-FE25-432A-B7F6-7BDB637AC3B5}" type="datetimeFigureOut">
               <a:rPr lang="en-IN" smtClean="0"/>
-              <a:t>09-08-2021</a:t>
+              <a:t>15-09-2021</a:t>
             </a:fld>
             <a:endParaRPr lang="en-IN"/>
           </a:p>
@@ -680,7 +680,7 @@
           <a:p>
             <a:fld id="{474FEC44-FE25-432A-B7F6-7BDB637AC3B5}" type="datetimeFigureOut">
               <a:rPr lang="en-IN" smtClean="0"/>
-              <a:t>09-08-2021</a:t>
+              <a:t>15-09-2021</a:t>
             </a:fld>
             <a:endParaRPr lang="en-IN"/>
           </a:p>
@@ -880,7 +880,7 @@
           <a:p>
             <a:fld id="{474FEC44-FE25-432A-B7F6-7BDB637AC3B5}" type="datetimeFigureOut">
               <a:rPr lang="en-IN" smtClean="0"/>
-              <a:t>09-08-2021</a:t>
+              <a:t>15-09-2021</a:t>
             </a:fld>
             <a:endParaRPr lang="en-IN"/>
           </a:p>
@@ -1156,7 +1156,7 @@
           <a:p>
             <a:fld id="{474FEC44-FE25-432A-B7F6-7BDB637AC3B5}" type="datetimeFigureOut">
               <a:rPr lang="en-IN" smtClean="0"/>
-              <a:t>09-08-2021</a:t>
+              <a:t>15-09-2021</a:t>
             </a:fld>
             <a:endParaRPr lang="en-IN"/>
           </a:p>
@@ -1424,7 +1424,7 @@
           <a:p>
             <a:fld id="{474FEC44-FE25-432A-B7F6-7BDB637AC3B5}" type="datetimeFigureOut">
               <a:rPr lang="en-IN" smtClean="0"/>
-              <a:t>09-08-2021</a:t>
+              <a:t>15-09-2021</a:t>
             </a:fld>
             <a:endParaRPr lang="en-IN"/>
           </a:p>
@@ -1839,7 +1839,7 @@
           <a:p>
             <a:fld id="{474FEC44-FE25-432A-B7F6-7BDB637AC3B5}" type="datetimeFigureOut">
               <a:rPr lang="en-IN" smtClean="0"/>
-              <a:t>09-08-2021</a:t>
+              <a:t>15-09-2021</a:t>
             </a:fld>
             <a:endParaRPr lang="en-IN"/>
           </a:p>
@@ -1981,7 +1981,7 @@
           <a:p>
             <a:fld id="{474FEC44-FE25-432A-B7F6-7BDB637AC3B5}" type="datetimeFigureOut">
               <a:rPr lang="en-IN" smtClean="0"/>
-              <a:t>09-08-2021</a:t>
+              <a:t>15-09-2021</a:t>
             </a:fld>
             <a:endParaRPr lang="en-IN"/>
           </a:p>
@@ -2094,7 +2094,7 @@
           <a:p>
             <a:fld id="{474FEC44-FE25-432A-B7F6-7BDB637AC3B5}" type="datetimeFigureOut">
               <a:rPr lang="en-IN" smtClean="0"/>
-              <a:t>09-08-2021</a:t>
+              <a:t>15-09-2021</a:t>
             </a:fld>
             <a:endParaRPr lang="en-IN"/>
           </a:p>
@@ -2407,7 +2407,7 @@
           <a:p>
             <a:fld id="{474FEC44-FE25-432A-B7F6-7BDB637AC3B5}" type="datetimeFigureOut">
               <a:rPr lang="en-IN" smtClean="0"/>
-              <a:t>09-08-2021</a:t>
+              <a:t>15-09-2021</a:t>
             </a:fld>
             <a:endParaRPr lang="en-IN"/>
           </a:p>
@@ -2696,7 +2696,7 @@
           <a:p>
             <a:fld id="{474FEC44-FE25-432A-B7F6-7BDB637AC3B5}" type="datetimeFigureOut">
               <a:rPr lang="en-IN" smtClean="0"/>
-              <a:t>09-08-2021</a:t>
+              <a:t>15-09-2021</a:t>
             </a:fld>
             <a:endParaRPr lang="en-IN"/>
           </a:p>
@@ -2939,7 +2939,7 @@
           <a:p>
             <a:fld id="{474FEC44-FE25-432A-B7F6-7BDB637AC3B5}" type="datetimeFigureOut">
               <a:rPr lang="en-IN" smtClean="0"/>
-              <a:t>09-08-2021</a:t>
+              <a:t>15-09-2021</a:t>
             </a:fld>
             <a:endParaRPr lang="en-IN"/>
           </a:p>

</xml_diff>